<commit_message>
Comments and minor fixes
</commit_message>
<xml_diff>
--- a/Courses/Software-Sciences/IT-Module-3-Web-Design/05-Web-Pages-Design/05-Web-Pages-Design.pptx
+++ b/Courses/Software-Sciences/IT-Module-3-Web-Design/05-Web-Pages-Design/05-Web-Pages-Design.pptx
@@ -239,6 +239,12 @@
 </p:presentation>
 </file>
 
+<file path=ppt/authors.xml><?xml version="1.0" encoding="utf-8"?>
+<p188:authorLst xmlns:a="http://schemas.openxmlformats.org/drawingml/2006/main" xmlns:r="http://schemas.openxmlformats.org/officeDocument/2006/relationships" xmlns:p188="http://schemas.microsoft.com/office/powerpoint/2018/8/main">
+  <p188:author id="{CB4BF2F8-D32F-9387-A6CE-368ED6EFDCF0}" name="Zaraliev" initials="KZ" userId="S::Zaraliev@students.softuni.bg::e1c6524a-140e-4108-9ad5-216363431969" providerId="AD"/>
+</p188:authorLst>
+</file>
+
 <file path=ppt/commentAuthors.xml><?xml version="1.0" encoding="utf-8"?>
 <p:cmAuthorLst xmlns:a="http://schemas.openxmlformats.org/drawingml/2006/main" xmlns:r="http://schemas.openxmlformats.org/officeDocument/2006/relationships" xmlns:p="http://schemas.openxmlformats.org/presentationml/2006/main">
   <p:cmAuthor id="1" name="PC" initials="P" lastIdx="8" clrIdx="0">
@@ -256,6 +262,89 @@
     </p:extLst>
   </p:cmAuthor>
 </p:cmAuthorLst>
+</file>
+
+<file path=ppt/comments/modernComment_358_D829CF31.xml><?xml version="1.0" encoding="utf-8"?>
+<p188:cmLst xmlns:a="http://schemas.openxmlformats.org/drawingml/2006/main" xmlns:r="http://schemas.openxmlformats.org/officeDocument/2006/relationships" xmlns:p188="http://schemas.microsoft.com/office/powerpoint/2018/8/main">
+  <p188:cm id="{87662D8D-81AF-48B0-A380-E9DEB87A4765}" authorId="{CB4BF2F8-D32F-9387-A6CE-368ED6EFDCF0}" created="2025-11-21T10:49:52.370">
+    <ac:deMkLst xmlns:ac="http://schemas.microsoft.com/office/drawing/2013/main/command">
+      <pc:docMk xmlns:pc="http://schemas.microsoft.com/office/powerpoint/2013/main/command"/>
+      <pc:sldMk xmlns:pc="http://schemas.microsoft.com/office/powerpoint/2013/main/command" cId="3626618673" sldId="856"/>
+      <ac:spMk id="4" creationId="{58EFFA6B-E941-CD02-0160-B57EC237EBD8}"/>
+    </ac:deMkLst>
+    <p188:txBody>
+      <a:bodyPr/>
+      <a:lstStyle/>
+      <a:p>
+        <a:r>
+          <a:rPr lang="en-GB"/>
+          <a:t>Акцентите да са отделни фигури с анимации</a:t>
+        </a:r>
+      </a:p>
+    </p188:txBody>
+  </p188:cm>
+</p188:cmLst>
+</file>
+
+<file path=ppt/comments/modernComment_35D_D5DBC4F0.xml><?xml version="1.0" encoding="utf-8"?>
+<p188:cmLst xmlns:a="http://schemas.openxmlformats.org/drawingml/2006/main" xmlns:r="http://schemas.openxmlformats.org/officeDocument/2006/relationships" xmlns:p188="http://schemas.microsoft.com/office/powerpoint/2018/8/main">
+  <p188:cm id="{9948103B-3533-42F6-B2D5-782DF7180215}" authorId="{CB4BF2F8-D32F-9387-A6CE-368ED6EFDCF0}" created="2025-11-21T10:51:27.942">
+    <ac:deMkLst xmlns:ac="http://schemas.microsoft.com/office/drawing/2013/main/command">
+      <pc:docMk xmlns:pc="http://schemas.microsoft.com/office/powerpoint/2013/main/command"/>
+      <pc:sldMk xmlns:pc="http://schemas.microsoft.com/office/powerpoint/2013/main/command" cId="3587949808" sldId="861"/>
+      <ac:picMk id="11" creationId="{C251B3E1-C3D1-89CD-F0F4-789682E08090}"/>
+    </ac:deMkLst>
+    <p188:txBody>
+      <a:bodyPr/>
+      <a:lstStyle/>
+      <a:p>
+        <a:r>
+          <a:rPr lang="en-GB"/>
+          <a:t>Нека изображението да е placeholder</a:t>
+        </a:r>
+      </a:p>
+    </p188:txBody>
+  </p188:cm>
+  <p188:cm id="{AC988AF6-368C-4031-AB9C-720B25DB8E4A}" authorId="{CB4BF2F8-D32F-9387-A6CE-368ED6EFDCF0}" created="2025-11-21T10:52:15.779">
+    <ac:deMkLst xmlns:ac="http://schemas.microsoft.com/office/drawing/2013/main/command">
+      <pc:docMk xmlns:pc="http://schemas.microsoft.com/office/powerpoint/2013/main/command"/>
+      <pc:sldMk xmlns:pc="http://schemas.microsoft.com/office/powerpoint/2013/main/command" cId="3587949808" sldId="861"/>
+      <ac:picMk id="7" creationId="{C7A9BD49-046F-2415-3C85-F40FF5B63F10}"/>
+    </ac:deMkLst>
+    <p188:txBody>
+      <a:bodyPr/>
+      <a:lstStyle/>
+      <a:p>
+        <a:r>
+          <a:rPr lang="en-GB"/>
+          <a:t>Също логото да е с placeholder</a:t>
+        </a:r>
+      </a:p>
+    </p188:txBody>
+  </p188:cm>
+</p188:cmLst>
+</file>
+
+<file path=ppt/comments/modernComment_35F_63CB320C.xml><?xml version="1.0" encoding="utf-8"?>
+<p188:cmLst xmlns:a="http://schemas.openxmlformats.org/drawingml/2006/main" xmlns:r="http://schemas.openxmlformats.org/officeDocument/2006/relationships" xmlns:p188="http://schemas.microsoft.com/office/powerpoint/2018/8/main">
+  <p188:cm id="{63474D5B-5794-4D4B-B294-B44BC236949A}" authorId="{CB4BF2F8-D32F-9387-A6CE-368ED6EFDCF0}" created="2025-11-21T10:54:12.050">
+    <ac:deMkLst xmlns:ac="http://schemas.microsoft.com/office/drawing/2013/main/command">
+      <pc:docMk xmlns:pc="http://schemas.microsoft.com/office/powerpoint/2013/main/command"/>
+      <pc:sldMk xmlns:pc="http://schemas.microsoft.com/office/powerpoint/2013/main/command" cId="1674261004" sldId="863"/>
+      <ac:picMk id="5" creationId="{C3120F3C-AAE4-3A55-E50D-BFDB9257AB15}"/>
+    </ac:deMkLst>
+    <p188:txBody>
+      <a:bodyPr/>
+      <a:lstStyle/>
+      <a:p>
+        <a:r>
+          <a:rPr lang="en-GB"/>
+          <a:t>Маршрутите да се оформят като картички</a:t>
+        </a:r>
+      </a:p>
+    </p188:txBody>
+  </p188:cm>
+</p188:cmLst>
 </file>
 
 <file path=ppt/handoutMasters/handoutMaster1.xml><?xml version="1.0" encoding="utf-8"?>
@@ -352,7 +441,7 @@
           <a:p>
             <a:fld id="{4E087215-0C8F-4762-A664-737A353EC9A4}" type="datetimeFigureOut">
               <a:rPr lang="bg-BG" smtClean="0"/>
-              <a:t>31.10.25 г.</a:t>
+              <a:t>21.11.2025 г.</a:t>
             </a:fld>
             <a:endParaRPr lang="bg-BG"/>
           </a:p>
@@ -548,7 +637,7 @@
           <a:p>
             <a:fld id="{72D84649-876A-46C9-8472-14CB09C070D8}" type="datetimeFigureOut">
               <a:rPr lang="en-US" smtClean="0"/>
-              <a:t>10/31/25</a:t>
+              <a:t>11/21/2025</a:t>
             </a:fld>
             <a:endParaRPr lang="en-US"/>
           </a:p>
@@ -19119,11 +19208,11 @@
   <p:clrMapOvr>
     <a:masterClrMapping/>
   </p:clrMapOvr>
-  <mc:AlternateContent xmlns:mc="http://schemas.openxmlformats.org/markup-compatibility/2006">
-    <mc:Choice xmlns:p14="http://schemas.microsoft.com/office/powerpoint/2010/main" Requires="p14">
+  <mc:AlternateContent xmlns:mc="http://schemas.openxmlformats.org/markup-compatibility/2006" xmlns:p14="http://schemas.microsoft.com/office/powerpoint/2010/main">
+    <mc:Choice Requires="p14">
       <p:transition spd="slow" p14:dur="2000" advClick="0" advTm="5000"/>
     </mc:Choice>
-    <mc:Fallback>
+    <mc:Fallback xmlns="">
       <p:transition spd="slow" advClick="0" advTm="5000"/>
     </mc:Fallback>
   </mc:AlternateContent>
@@ -19395,7 +19484,7 @@
             </a:r>
             <a:r>
               <a:rPr lang="bg-BG" sz="3200" b="1" dirty="0"/>
-              <a:t>форма за връзка</a:t>
+              <a:t>контактна форма</a:t>
             </a:r>
             <a:r>
               <a:rPr lang="bg-BG" sz="3200" dirty="0"/>
@@ -19630,11 +19719,11 @@
   <p:clrMapOvr>
     <a:masterClrMapping/>
   </p:clrMapOvr>
-  <mc:AlternateContent xmlns:mc="http://schemas.openxmlformats.org/markup-compatibility/2006">
-    <mc:Choice xmlns:p14="http://schemas.microsoft.com/office/powerpoint/2010/main" Requires="p14">
+  <mc:AlternateContent xmlns:mc="http://schemas.openxmlformats.org/markup-compatibility/2006" xmlns:p14="http://schemas.microsoft.com/office/powerpoint/2010/main">
+    <mc:Choice Requires="p14">
       <p:transition spd="slow" p14:dur="2000" advClick="0" advTm="5000"/>
     </mc:Choice>
-    <mc:Fallback>
+    <mc:Fallback xmlns="">
       <p:transition spd="slow" advClick="0" advTm="5000"/>
     </mc:Fallback>
   </mc:AlternateContent>
@@ -19861,8 +19950,8 @@
         </p:nvSpPr>
         <p:spPr>
           <a:xfrm>
-            <a:off x="2001000" y="1121143"/>
-            <a:ext cx="9994234" cy="5546589"/>
+            <a:off x="2091000" y="1121143"/>
+            <a:ext cx="9904234" cy="5546589"/>
           </a:xfrm>
         </p:spPr>
         <p:txBody>
@@ -21214,11 +21303,11 @@
   <p:clrMapOvr>
     <a:masterClrMapping/>
   </p:clrMapOvr>
-  <mc:AlternateContent xmlns:mc="http://schemas.openxmlformats.org/markup-compatibility/2006">
-    <mc:Choice xmlns:p14="http://schemas.microsoft.com/office/powerpoint/2010/main" Requires="p14">
+  <mc:AlternateContent xmlns:mc="http://schemas.openxmlformats.org/markup-compatibility/2006" xmlns:p14="http://schemas.microsoft.com/office/powerpoint/2010/main">
+    <mc:Choice Requires="p14">
       <p:transition spd="slow" p14:dur="2000" advClick="0" advTm="5000"/>
     </mc:Choice>
-    <mc:Fallback>
+    <mc:Fallback xmlns="">
       <p:transition spd="slow" advClick="0" advTm="5000"/>
     </mc:Fallback>
   </mc:AlternateContent>
@@ -21722,7 +21811,7 @@
           <p:nvPr/>
         </p:nvPicPr>
         <p:blipFill>
-          <a:blip r:embed="rId3">
+          <a:blip r:embed="rId4">
             <a:extLst>
               <a:ext uri="{28A0092B-C50C-407E-A947-70E740481C1C}">
                 <a14:useLocalDpi xmlns:a14="http://schemas.microsoft.com/office/drawing/2010/main" val="0"/>
@@ -21746,6 +21835,78 @@
           </a:ln>
         </p:spPr>
       </p:pic>
+      <p:sp>
+        <p:nvSpPr>
+          <p:cNvPr id="4" name="Rectangle 3">
+            <a:extLst>
+              <a:ext uri="{FF2B5EF4-FFF2-40B4-BE49-F238E27FC236}">
+                <a16:creationId xmlns:a16="http://schemas.microsoft.com/office/drawing/2014/main" id="{58EFFA6B-E941-CD02-0160-B57EC237EBD8}"/>
+              </a:ext>
+            </a:extLst>
+          </p:cNvPr>
+          <p:cNvSpPr/>
+          <p:nvPr/>
+        </p:nvSpPr>
+        <p:spPr bwMode="auto">
+          <a:xfrm>
+            <a:off x="1191000" y="3601213"/>
+            <a:ext cx="7335000" cy="1935000"/>
+          </a:xfrm>
+          <a:prstGeom prst="rect">
+            <a:avLst/>
+          </a:prstGeom>
+          <a:noFill/>
+          <a:ln w="57150">
+            <a:solidFill>
+              <a:schemeClr val="tx1">
+                <a:lumMod val="75000"/>
+                <a:alpha val="80000"/>
+              </a:schemeClr>
+            </a:solidFill>
+          </a:ln>
+          <a:effectLst/>
+        </p:spPr>
+        <p:style>
+          <a:lnRef idx="2">
+            <a:schemeClr val="accent1">
+              <a:shade val="50000"/>
+            </a:schemeClr>
+          </a:lnRef>
+          <a:fillRef idx="1001">
+            <a:schemeClr val="dk2"/>
+          </a:fillRef>
+          <a:effectRef idx="0">
+            <a:schemeClr val="accent1"/>
+          </a:effectRef>
+          <a:fontRef idx="minor">
+            <a:schemeClr val="lt1"/>
+          </a:fontRef>
+        </p:style>
+        <p:txBody>
+          <a:bodyPr rot="0" spcFirstLastPara="0" vertOverflow="overflow" horzOverflow="overflow" vert="horz" wrap="square" lIns="91440" tIns="45720" rIns="91440" bIns="45720" numCol="1" spcCol="0" rtlCol="0" fromWordArt="0" anchor="ctr" anchorCtr="0" forceAA="0" compatLnSpc="1">
+            <a:prstTxWarp prst="textNoShape">
+              <a:avLst/>
+            </a:prstTxWarp>
+            <a:noAutofit/>
+          </a:bodyPr>
+          <a:lstStyle/>
+          <a:p>
+            <a:pPr algn="ctr"/>
+            <a:endParaRPr lang="en-GB" sz="2800" b="1" dirty="0">
+              <a:solidFill>
+                <a:srgbClr val="FFFFFF"/>
+              </a:solidFill>
+              <a:effectLst>
+                <a:outerShdw blurRad="38100" dist="38100" dir="2700000" algn="tl">
+                  <a:srgbClr val="000000">
+                    <a:alpha val="43137"/>
+                  </a:srgbClr>
+                </a:outerShdw>
+              </a:effectLst>
+            </a:endParaRPr>
+          </a:p>
+        </p:txBody>
+      </p:sp>
     </p:spTree>
     <p:extLst>
       <p:ext uri="{BB962C8B-B14F-4D97-AF65-F5344CB8AC3E}">
@@ -21756,11 +21917,11 @@
   <p:clrMapOvr>
     <a:masterClrMapping/>
   </p:clrMapOvr>
-  <mc:AlternateContent xmlns:mc="http://schemas.openxmlformats.org/markup-compatibility/2006">
-    <mc:Choice xmlns:p14="http://schemas.microsoft.com/office/powerpoint/2010/main" Requires="p14">
+  <mc:AlternateContent xmlns:mc="http://schemas.openxmlformats.org/markup-compatibility/2006" xmlns:p14="http://schemas.microsoft.com/office/powerpoint/2010/main">
+    <mc:Choice Requires="p14">
       <p:transition spd="slow" p14:dur="2000" advClick="0" advTm="5000"/>
     </mc:Choice>
-    <mc:Fallback>
+    <mc:Fallback xmlns="">
       <p:transition spd="slow" advClick="0" advTm="5000"/>
     </mc:Fallback>
   </mc:AlternateContent>
@@ -21866,6 +22027,51 @@
                       </p:childTnLst>
                     </p:cTn>
                   </p:par>
+                  <p:par>
+                    <p:cTn id="11" fill="hold">
+                      <p:stCondLst>
+                        <p:cond delay="indefinite"/>
+                      </p:stCondLst>
+                      <p:childTnLst>
+                        <p:par>
+                          <p:cTn id="12" fill="hold">
+                            <p:stCondLst>
+                              <p:cond delay="0"/>
+                            </p:stCondLst>
+                            <p:childTnLst>
+                              <p:par>
+                                <p:cTn id="13" presetID="1" presetClass="entr" presetSubtype="0" fill="hold" grpId="0" nodeType="clickEffect">
+                                  <p:stCondLst>
+                                    <p:cond delay="0"/>
+                                  </p:stCondLst>
+                                  <p:childTnLst>
+                                    <p:set>
+                                      <p:cBhvr>
+                                        <p:cTn id="14" dur="1" fill="hold">
+                                          <p:stCondLst>
+                                            <p:cond delay="0"/>
+                                          </p:stCondLst>
+                                        </p:cTn>
+                                        <p:tgtEl>
+                                          <p:spTgt spid="4"/>
+                                        </p:tgtEl>
+                                        <p:attrNameLst>
+                                          <p:attrName>style.visibility</p:attrName>
+                                        </p:attrNameLst>
+                                      </p:cBhvr>
+                                      <p:to>
+                                        <p:strVal val="visible"/>
+                                      </p:to>
+                                    </p:set>
+                                  </p:childTnLst>
+                                </p:cTn>
+                              </p:par>
+                            </p:childTnLst>
+                          </p:cTn>
+                        </p:par>
+                      </p:childTnLst>
+                    </p:cTn>
+                  </p:par>
                 </p:childTnLst>
               </p:cTn>
               <p:prevCondLst>
@@ -21887,7 +22093,15 @@
         </p:cTn>
       </p:par>
     </p:tnLst>
+    <p:bldLst>
+      <p:bldP spid="4" grpId="0" animBg="1"/>
+    </p:bldLst>
   </p:timing>
+  <p:extLst>
+    <p:ext uri="{6950BFC3-D8DA-4A85-94F7-54DA5524770B}">
+      <p188:commentRel xmlns:p188="http://schemas.microsoft.com/office/powerpoint/2018/8/main" r:id="rId3"/>
+    </p:ext>
+  </p:extLst>
 </p:sld>
 </file>
 
@@ -22115,11 +22329,11 @@
   <p:clrMapOvr>
     <a:masterClrMapping/>
   </p:clrMapOvr>
-  <mc:AlternateContent xmlns:mc="http://schemas.openxmlformats.org/markup-compatibility/2006">
-    <mc:Choice xmlns:p14="http://schemas.microsoft.com/office/powerpoint/2010/main" Requires="p14">
+  <mc:AlternateContent xmlns:mc="http://schemas.openxmlformats.org/markup-compatibility/2006" xmlns:p14="http://schemas.microsoft.com/office/powerpoint/2010/main">
+    <mc:Choice Requires="p14">
       <p:transition spd="slow" p14:dur="2000" advClick="0" advTm="5000"/>
     </mc:Choice>
-    <mc:Fallback>
+    <mc:Fallback xmlns="">
       <p:transition spd="slow" advClick="0" advTm="5000"/>
     </mc:Fallback>
   </mc:AlternateContent>
@@ -22458,11 +22672,11 @@
   <p:clrMapOvr>
     <a:masterClrMapping/>
   </p:clrMapOvr>
-  <mc:AlternateContent xmlns:mc="http://schemas.openxmlformats.org/markup-compatibility/2006">
-    <mc:Choice xmlns:p14="http://schemas.microsoft.com/office/powerpoint/2010/main" Requires="p14">
+  <mc:AlternateContent xmlns:mc="http://schemas.openxmlformats.org/markup-compatibility/2006" xmlns:p14="http://schemas.microsoft.com/office/powerpoint/2010/main">
+    <mc:Choice Requires="p14">
       <p:transition spd="slow" p14:dur="2000" advClick="0" advTm="5000"/>
     </mc:Choice>
-    <mc:Fallback>
+    <mc:Fallback xmlns="">
       <p:transition spd="slow" advClick="0" advTm="5000"/>
     </mc:Fallback>
   </mc:AlternateContent>
@@ -23020,7 +23234,7 @@
           <p:nvPr/>
         </p:nvPicPr>
         <p:blipFill rotWithShape="1">
-          <a:blip r:embed="rId3">
+          <a:blip r:embed="rId4">
             <a:extLst>
               <a:ext uri="{28A0092B-C50C-407E-A947-70E740481C1C}">
                 <a14:useLocalDpi xmlns:a14="http://schemas.microsoft.com/office/drawing/2010/main" val="0"/>
@@ -23062,7 +23276,7 @@
           <p:nvPr/>
         </p:nvPicPr>
         <p:blipFill>
-          <a:blip r:embed="rId4">
+          <a:blip r:embed="rId5">
             <a:extLst>
               <a:ext uri="{28A0092B-C50C-407E-A947-70E740481C1C}">
                 <a14:useLocalDpi xmlns:a14="http://schemas.microsoft.com/office/drawing/2010/main" val="0"/>
@@ -23176,7 +23390,7 @@
           <p:nvPr/>
         </p:nvPicPr>
         <p:blipFill>
-          <a:blip r:embed="rId5">
+          <a:blip r:embed="rId6">
             <a:extLst>
               <a:ext uri="{28A0092B-C50C-407E-A947-70E740481C1C}">
                 <a14:useLocalDpi xmlns:a14="http://schemas.microsoft.com/office/drawing/2010/main" val="0"/>
@@ -23210,11 +23424,11 @@
   <p:clrMapOvr>
     <a:masterClrMapping/>
   </p:clrMapOvr>
-  <mc:AlternateContent xmlns:mc="http://schemas.openxmlformats.org/markup-compatibility/2006">
-    <mc:Choice xmlns:p14="http://schemas.microsoft.com/office/powerpoint/2010/main" Requires="p14">
+  <mc:AlternateContent xmlns:mc="http://schemas.openxmlformats.org/markup-compatibility/2006" xmlns:p14="http://schemas.microsoft.com/office/powerpoint/2010/main">
+    <mc:Choice Requires="p14">
       <p:transition spd="slow" p14:dur="2000" advClick="0" advTm="5000"/>
     </mc:Choice>
-    <mc:Fallback>
+    <mc:Fallback xmlns="">
       <p:transition spd="slow" advClick="0" advTm="5000"/>
     </mc:Fallback>
   </mc:AlternateContent>
@@ -23480,6 +23694,11 @@
       <p:bldP spid="8" grpId="0" animBg="1"/>
     </p:bldLst>
   </p:timing>
+  <p:extLst>
+    <p:ext uri="{6950BFC3-D8DA-4A85-94F7-54DA5524770B}">
+      <p188:commentRel xmlns:p188="http://schemas.microsoft.com/office/powerpoint/2018/8/main" r:id="rId3"/>
+    </p:ext>
+  </p:extLst>
 </p:sld>
 </file>
 
@@ -23852,7 +24071,7 @@
           <p:nvPr/>
         </p:nvPicPr>
         <p:blipFill>
-          <a:blip r:embed="rId3">
+          <a:blip r:embed="rId4">
             <a:extLst>
               <a:ext uri="{28A0092B-C50C-407E-A947-70E740481C1C}">
                 <a14:useLocalDpi xmlns:a14="http://schemas.microsoft.com/office/drawing/2010/main" val="0"/>
@@ -23891,7 +24110,7 @@
           <p:nvPr/>
         </p:nvPicPr>
         <p:blipFill>
-          <a:blip r:embed="rId4">
+          <a:blip r:embed="rId5">
             <a:extLst>
               <a:ext uri="{28A0092B-C50C-407E-A947-70E740481C1C}">
                 <a14:useLocalDpi xmlns:a14="http://schemas.microsoft.com/office/drawing/2010/main" val="0"/>
@@ -23925,11 +24144,11 @@
   <p:clrMapOvr>
     <a:masterClrMapping/>
   </p:clrMapOvr>
-  <mc:AlternateContent xmlns:mc="http://schemas.openxmlformats.org/markup-compatibility/2006">
-    <mc:Choice xmlns:p14="http://schemas.microsoft.com/office/powerpoint/2010/main" Requires="p14">
+  <mc:AlternateContent xmlns:mc="http://schemas.openxmlformats.org/markup-compatibility/2006" xmlns:p14="http://schemas.microsoft.com/office/powerpoint/2010/main">
+    <mc:Choice Requires="p14">
       <p:transition spd="slow" p14:dur="2000" advClick="0" advTm="5000"/>
     </mc:Choice>
-    <mc:Fallback>
+    <mc:Fallback xmlns="">
       <p:transition spd="slow" advClick="0" advTm="5000"/>
     </mc:Fallback>
   </mc:AlternateContent>
@@ -24102,6 +24321,11 @@
       </p:par>
     </p:tnLst>
   </p:timing>
+  <p:extLst>
+    <p:ext uri="{6950BFC3-D8DA-4A85-94F7-54DA5524770B}">
+      <p188:commentRel xmlns:p188="http://schemas.microsoft.com/office/powerpoint/2018/8/main" r:id="rId3"/>
+    </p:ext>
+  </p:extLst>
 </p:sld>
 </file>
 
@@ -24487,11 +24711,11 @@
   <p:clrMapOvr>
     <a:masterClrMapping/>
   </p:clrMapOvr>
-  <mc:AlternateContent xmlns:mc="http://schemas.openxmlformats.org/markup-compatibility/2006">
-    <mc:Choice xmlns:p14="http://schemas.microsoft.com/office/powerpoint/2010/main" Requires="p14">
+  <mc:AlternateContent xmlns:mc="http://schemas.openxmlformats.org/markup-compatibility/2006" xmlns:p14="http://schemas.microsoft.com/office/powerpoint/2010/main">
+    <mc:Choice Requires="p14">
       <p:transition spd="slow" p14:dur="2000" advClick="0" advTm="5000"/>
     </mc:Choice>
-    <mc:Fallback>
+    <mc:Fallback xmlns="">
       <p:transition spd="slow" advClick="0" advTm="5000"/>
     </mc:Fallback>
   </mc:AlternateContent>
@@ -26659,15 +26883,15 @@
             </a:r>
             <a:r>
               <a:rPr lang="bg-BG" sz="3600" dirty="0"/>
-              <a:t>, за може </a:t>
+              <a:t>, за да може </a:t>
             </a:r>
             <a:r>
               <a:rPr lang="bg-BG" sz="3600" b="1" dirty="0"/>
-              <a:t>уеб сайтът</a:t>
+              <a:t>уеб страниците</a:t>
             </a:r>
             <a:r>
               <a:rPr lang="bg-BG" sz="3600" dirty="0"/>
-              <a:t> да бъде</a:t>
+              <a:t> да бъдат</a:t>
             </a:r>
             <a:r>
               <a:rPr lang="en-US" sz="3600" dirty="0"/>
@@ -26682,7 +26906,7 @@
                   <a:schemeClr val="bg1"/>
                 </a:solidFill>
               </a:rPr>
-              <a:t>Удобен</a:t>
+              <a:t>Удобни</a:t>
             </a:r>
             <a:r>
               <a:rPr lang="bg-BG" sz="3400" dirty="0"/>
@@ -26696,25 +26920,6 @@
           <a:p>
             <a:pPr lvl="1"/>
             <a:r>
-              <a:rPr lang="bg-BG" sz="3400" b="1" dirty="0">
-                <a:solidFill>
-                  <a:schemeClr val="bg1"/>
-                </a:solidFill>
-              </a:rPr>
-              <a:t>Лесен</a:t>
-            </a:r>
-            <a:r>
-              <a:rPr lang="bg-BG" sz="3400" dirty="0"/>
-              <a:t> за </a:t>
-            </a:r>
-            <a:r>
-              <a:rPr lang="bg-BG" sz="3400" b="1" dirty="0"/>
-              <a:t>навигация</a:t>
-            </a:r>
-          </a:p>
-          <a:p>
-            <a:pPr lvl="1"/>
-            <a:r>
               <a:rPr lang="bg-BG" sz="3400" b="1" dirty="0"/>
               <a:t>Визуално </a:t>
             </a:r>
@@ -26724,7 +26929,7 @@
                   <a:schemeClr val="bg1"/>
                 </a:solidFill>
               </a:rPr>
-              <a:t>привлекателен</a:t>
+              <a:t>привлекателни</a:t>
             </a:r>
           </a:p>
           <a:p>
@@ -26735,7 +26940,7 @@
                   <a:schemeClr val="bg1"/>
                 </a:solidFill>
               </a:rPr>
-              <a:t>Съвместим</a:t>
+              <a:t>Съвместими</a:t>
             </a:r>
             <a:r>
               <a:rPr lang="bg-BG" sz="3400" dirty="0"/>
@@ -26753,14 +26958,6 @@
               <a:rPr lang="bg-BG" sz="3400" b="1" dirty="0"/>
               <a:t>потребности</a:t>
             </a:r>
-          </a:p>
-          <a:p>
-            <a:pPr>
-              <a:buClr>
-                <a:schemeClr val="tx1"/>
-              </a:buClr>
-            </a:pPr>
-            <a:endParaRPr lang="en-US" sz="3400" dirty="0"/>
           </a:p>
         </p:txBody>
       </p:sp>
@@ -26824,7 +27021,7 @@
         </p:blipFill>
         <p:spPr>
           <a:xfrm>
-            <a:off x="8795334" y="2070508"/>
+            <a:off x="8812875" y="2124000"/>
             <a:ext cx="2953125" cy="3780000"/>
           </a:xfrm>
           <a:prstGeom prst="rect">
@@ -26901,39 +27098,26 @@
                                   </p:childTnLst>
                                 </p:cTn>
                               </p:par>
+                            </p:childTnLst>
+                          </p:cTn>
+                        </p:par>
+                      </p:childTnLst>
+                    </p:cTn>
+                  </p:par>
+                  <p:par>
+                    <p:cTn id="7" fill="hold">
+                      <p:stCondLst>
+                        <p:cond delay="indefinite"/>
+                      </p:stCondLst>
+                      <p:childTnLst>
+                        <p:par>
+                          <p:cTn id="8" fill="hold">
+                            <p:stCondLst>
+                              <p:cond delay="0"/>
+                            </p:stCondLst>
+                            <p:childTnLst>
                               <p:par>
-                                <p:cTn id="7" presetID="1" presetClass="entr" presetSubtype="0" fill="hold" nodeType="withEffect">
-                                  <p:stCondLst>
-                                    <p:cond delay="0"/>
-                                  </p:stCondLst>
-                                  <p:childTnLst>
-                                    <p:set>
-                                      <p:cBhvr>
-                                        <p:cTn id="8" dur="1" fill="hold">
-                                          <p:stCondLst>
-                                            <p:cond delay="0"/>
-                                          </p:stCondLst>
-                                        </p:cTn>
-                                        <p:tgtEl>
-                                          <p:spTgt spid="7">
-                                            <p:txEl>
-                                              <p:pRg st="2" end="2"/>
-                                            </p:txEl>
-                                          </p:spTgt>
-                                        </p:tgtEl>
-                                        <p:attrNameLst>
-                                          <p:attrName>style.visibility</p:attrName>
-                                        </p:attrNameLst>
-                                      </p:cBhvr>
-                                      <p:to>
-                                        <p:strVal val="visible"/>
-                                      </p:to>
-                                    </p:set>
-                                  </p:childTnLst>
-                                </p:cTn>
-                              </p:par>
-                              <p:par>
-                                <p:cTn id="9" presetID="1" presetClass="entr" presetSubtype="0" fill="hold" nodeType="withEffect">
+                                <p:cTn id="9" presetID="1" presetClass="entr" presetSubtype="0" fill="hold" nodeType="clickEffect">
                                   <p:stCondLst>
                                     <p:cond delay="0"/>
                                   </p:stCondLst>
@@ -26948,7 +27132,7 @@
                                         <p:tgtEl>
                                           <p:spTgt spid="7">
                                             <p:txEl>
-                                              <p:pRg st="3" end="3"/>
+                                              <p:pRg st="2" end="2"/>
                                             </p:txEl>
                                           </p:spTgt>
                                         </p:tgtEl>
@@ -26979,7 +27163,7 @@
                                         <p:tgtEl>
                                           <p:spTgt spid="7">
                                             <p:txEl>
-                                              <p:pRg st="4" end="4"/>
+                                              <p:pRg st="3" end="3"/>
                                             </p:txEl>
                                           </p:spTgt>
                                         </p:tgtEl>

</xml_diff>